<commit_message>
adding updated poster w/ resizing
</commit_message>
<xml_diff>
--- a/poster.pptx
+++ b/poster.pptx
@@ -15574,12 +15574,17 @@
             <p:ph type="body" sz="quarter" idx="10"/>
           </p:nvPr>
         </p:nvSpPr>
-        <p:spPr/>
+        <p:spPr>
+          <a:xfrm>
+            <a:off x="1049883" y="7201699"/>
+            <a:ext cx="12132653" cy="923307"/>
+          </a:xfrm>
+        </p:spPr>
         <p:txBody>
           <a:bodyPr/>
           <a:lstStyle/>
           <a:p>
-            <a:endParaRPr lang="en-US" dirty="0">
+            <a:endParaRPr lang="en-US" sz="3000" dirty="0">
               <a:latin typeface="Helvetica Neue" panose="02000503000000020004" pitchFamily="2" charset="0"/>
               <a:ea typeface="Helvetica Neue" panose="02000503000000020004" pitchFamily="2" charset="0"/>
               <a:cs typeface="Helvetica Neue" panose="02000503000000020004" pitchFamily="2" charset="0"/>
@@ -15597,12 +15602,20 @@
             <p:ph type="body" sz="quarter" idx="11"/>
           </p:nvPr>
         </p:nvSpPr>
-        <p:spPr/>
+        <p:spPr>
+          <a:xfrm>
+            <a:off x="845477" y="6319848"/>
+            <a:ext cx="12442032" cy="923322"/>
+          </a:xfrm>
+        </p:spPr>
         <p:txBody>
           <a:bodyPr/>
           <a:lstStyle/>
           <a:p>
-            <a:endParaRPr lang="en-US"/>
+            <a:r>
+              <a:rPr lang="en-US" sz="4800" dirty="0"/>
+              <a:t>INTRODUCTION AND ABSTRACT</a:t>
+            </a:r>
           </a:p>
         </p:txBody>
       </p:sp>
@@ -15618,15 +15631,15 @@
         </p:nvSpPr>
         <p:spPr>
           <a:xfrm>
-            <a:off x="845477" y="21840525"/>
-            <a:ext cx="12460125" cy="830975"/>
+            <a:off x="1049883" y="21840525"/>
+            <a:ext cx="12132653" cy="923307"/>
           </a:xfrm>
         </p:spPr>
         <p:txBody>
           <a:bodyPr/>
           <a:lstStyle/>
           <a:p>
-            <a:endParaRPr lang="en-US" dirty="0">
+            <a:endParaRPr lang="en-US" sz="3000" dirty="0">
               <a:latin typeface="Helvetica Neue" panose="02000503000000020004" pitchFamily="2" charset="0"/>
               <a:ea typeface="Helvetica Neue" panose="02000503000000020004" pitchFamily="2" charset="0"/>
               <a:cs typeface="Helvetica Neue" panose="02000503000000020004" pitchFamily="2" charset="0"/>
@@ -15644,12 +15657,20 @@
             <p:ph type="body" sz="quarter" idx="20"/>
           </p:nvPr>
         </p:nvSpPr>
-        <p:spPr/>
+        <p:spPr>
+          <a:xfrm>
+            <a:off x="863574" y="20958689"/>
+            <a:ext cx="12442031" cy="923322"/>
+          </a:xfrm>
+        </p:spPr>
         <p:txBody>
           <a:bodyPr/>
           <a:lstStyle/>
           <a:p>
-            <a:endParaRPr lang="en-US" dirty="0"/>
+            <a:r>
+              <a:rPr lang="en-US" sz="4800" dirty="0"/>
+              <a:t>OBJECTIVES</a:t>
+            </a:r>
           </a:p>
         </p:txBody>
       </p:sp>
@@ -15665,8 +15686,8 @@
         </p:nvSpPr>
         <p:spPr>
           <a:xfrm>
-            <a:off x="13891420" y="25828838"/>
-            <a:ext cx="12440573" cy="4598160"/>
+            <a:off x="14050476" y="25828838"/>
+            <a:ext cx="12132653" cy="6555619"/>
           </a:xfrm>
         </p:spPr>
         <p:txBody>
@@ -15674,7 +15695,7 @@
           <a:lstStyle/>
           <a:p>
             <a:r>
-              <a:rPr lang="en-US" b="1" dirty="0">
+              <a:rPr lang="en-US" sz="3000" b="1" dirty="0">
                 <a:latin typeface="Helvetica Neue" panose="02000503000000020004" pitchFamily="2" charset="0"/>
                 <a:ea typeface="Helvetica Neue" panose="02000503000000020004" pitchFamily="2" charset="0"/>
                 <a:cs typeface="Helvetica Neue" panose="02000503000000020004" pitchFamily="2" charset="0"/>
@@ -15688,7 +15709,7 @@
               <a:buChar char="•"/>
             </a:pPr>
             <a:r>
-              <a:rPr lang="en-US" i="1" dirty="0">
+              <a:rPr lang="en-US" sz="3000" i="1" dirty="0">
                 <a:latin typeface="Helvetica Neue" panose="02000503000000020004" pitchFamily="2" charset="0"/>
                 <a:ea typeface="Helvetica Neue" panose="02000503000000020004" pitchFamily="2" charset="0"/>
                 <a:cs typeface="Helvetica Neue" panose="02000503000000020004" pitchFamily="2" charset="0"/>
@@ -15696,7 +15717,7 @@
               <a:t>Preparation: </a:t>
             </a:r>
             <a:r>
-              <a:rPr lang="en-US" dirty="0">
+              <a:rPr lang="en-US" sz="3000" dirty="0">
                 <a:latin typeface="Helvetica Neue" panose="02000503000000020004" pitchFamily="2" charset="0"/>
                 <a:ea typeface="Helvetica Neue" panose="02000503000000020004" pitchFamily="2" charset="0"/>
                 <a:cs typeface="Helvetica Neue" panose="02000503000000020004" pitchFamily="2" charset="0"/>
@@ -15704,7 +15725,7 @@
               <a:t>use of </a:t>
             </a:r>
             <a:r>
-              <a:rPr lang="en-US" dirty="0" err="1">
+              <a:rPr lang="en-US" sz="3000" dirty="0" err="1">
                 <a:latin typeface="Helvetica Neue" panose="02000503000000020004" pitchFamily="2" charset="0"/>
                 <a:ea typeface="Helvetica Neue" panose="02000503000000020004" pitchFamily="2" charset="0"/>
                 <a:cs typeface="Helvetica Neue" panose="02000503000000020004" pitchFamily="2" charset="0"/>
@@ -15712,7 +15733,7 @@
               <a:t>Fatkun</a:t>
             </a:r>
             <a:r>
-              <a:rPr lang="en-US" dirty="0">
+              <a:rPr lang="en-US" sz="3000" dirty="0">
                 <a:latin typeface="Helvetica Neue" panose="02000503000000020004" pitchFamily="2" charset="0"/>
                 <a:ea typeface="Helvetica Neue" panose="02000503000000020004" pitchFamily="2" charset="0"/>
                 <a:cs typeface="Helvetica Neue" panose="02000503000000020004" pitchFamily="2" charset="0"/>
@@ -15726,7 +15747,7 @@
               <a:buChar char="•"/>
             </a:pPr>
             <a:r>
-              <a:rPr lang="en-US" i="1" dirty="0">
+              <a:rPr lang="en-US" sz="3000" i="1" dirty="0">
                 <a:latin typeface="Helvetica Neue" panose="02000503000000020004" pitchFamily="2" charset="0"/>
                 <a:ea typeface="Helvetica Neue" panose="02000503000000020004" pitchFamily="2" charset="0"/>
                 <a:cs typeface="Helvetica Neue" panose="02000503000000020004" pitchFamily="2" charset="0"/>
@@ -15734,7 +15755,7 @@
               <a:t>Annotation: </a:t>
             </a:r>
             <a:r>
-              <a:rPr lang="en-US" dirty="0">
+              <a:rPr lang="en-US" sz="3000" dirty="0">
                 <a:latin typeface="Helvetica Neue" panose="02000503000000020004" pitchFamily="2" charset="0"/>
                 <a:ea typeface="Helvetica Neue" panose="02000503000000020004" pitchFamily="2" charset="0"/>
                 <a:cs typeface="Helvetica Neue" panose="02000503000000020004" pitchFamily="2" charset="0"/>
@@ -15742,7 +15763,7 @@
               <a:t>the bounding boxes of each item were drawn with </a:t>
             </a:r>
             <a:r>
-              <a:rPr lang="en-US" dirty="0" err="1">
+              <a:rPr lang="en-US" sz="3000" dirty="0" err="1">
                 <a:latin typeface="Helvetica Neue" panose="02000503000000020004" pitchFamily="2" charset="0"/>
                 <a:ea typeface="Helvetica Neue" panose="02000503000000020004" pitchFamily="2" charset="0"/>
                 <a:cs typeface="Helvetica Neue" panose="02000503000000020004" pitchFamily="2" charset="0"/>
@@ -15750,7 +15771,7 @@
               <a:t>Vott</a:t>
             </a:r>
             <a:r>
-              <a:rPr lang="en-US" dirty="0">
+              <a:rPr lang="en-US" sz="3000" dirty="0">
                 <a:latin typeface="Helvetica Neue" panose="02000503000000020004" pitchFamily="2" charset="0"/>
                 <a:ea typeface="Helvetica Neue" panose="02000503000000020004" pitchFamily="2" charset="0"/>
                 <a:cs typeface="Helvetica Neue" panose="02000503000000020004" pitchFamily="2" charset="0"/>
@@ -15764,7 +15785,7 @@
               <a:buChar char="•"/>
             </a:pPr>
             <a:r>
-              <a:rPr lang="en-US" i="1" dirty="0">
+              <a:rPr lang="en-US" sz="3000" i="1" dirty="0">
                 <a:latin typeface="Helvetica Neue" panose="02000503000000020004" pitchFamily="2" charset="0"/>
                 <a:ea typeface="Helvetica Neue" panose="02000503000000020004" pitchFamily="2" charset="0"/>
                 <a:cs typeface="Helvetica Neue" panose="02000503000000020004" pitchFamily="2" charset="0"/>
@@ -15772,7 +15793,7 @@
               <a:t>Aggregation: </a:t>
             </a:r>
             <a:r>
-              <a:rPr lang="en-US" dirty="0">
+              <a:rPr lang="en-US" sz="3000" dirty="0">
                 <a:latin typeface="Helvetica Neue" panose="02000503000000020004" pitchFamily="2" charset="0"/>
                 <a:ea typeface="Helvetica Neue" panose="02000503000000020004" pitchFamily="2" charset="0"/>
                 <a:cs typeface="Helvetica Neue" panose="02000503000000020004" pitchFamily="2" charset="0"/>
@@ -15781,7 +15802,7 @@
             </a:r>
           </a:p>
           <a:p>
-            <a:endParaRPr lang="en-US" dirty="0">
+            <a:endParaRPr lang="en-US" sz="3000" dirty="0">
               <a:latin typeface="Helvetica Neue" panose="02000503000000020004" pitchFamily="2" charset="0"/>
               <a:ea typeface="Helvetica Neue" panose="02000503000000020004" pitchFamily="2" charset="0"/>
               <a:cs typeface="Helvetica Neue" panose="02000503000000020004" pitchFamily="2" charset="0"/>
@@ -15789,7 +15810,7 @@
           </a:p>
           <a:p>
             <a:r>
-              <a:rPr lang="en-US" b="1" dirty="0">
+              <a:rPr lang="en-US" sz="3000" b="1" dirty="0">
                 <a:latin typeface="Helvetica Neue" panose="02000503000000020004" pitchFamily="2" charset="0"/>
                 <a:ea typeface="Helvetica Neue" panose="02000503000000020004" pitchFamily="2" charset="0"/>
                 <a:cs typeface="Helvetica Neue" panose="02000503000000020004" pitchFamily="2" charset="0"/>
@@ -15802,7 +15823,7 @@
               <a:buFont typeface="Arial" panose="020B0604020202020204" pitchFamily="34" charset="0"/>
               <a:buChar char="•"/>
             </a:pPr>
-            <a:endParaRPr lang="en-US" b="1" dirty="0">
+            <a:endParaRPr lang="en-US" sz="3000" b="1" dirty="0">
               <a:latin typeface="Helvetica Neue" panose="02000503000000020004" pitchFamily="2" charset="0"/>
               <a:ea typeface="Helvetica Neue" panose="02000503000000020004" pitchFamily="2" charset="0"/>
               <a:cs typeface="Helvetica Neue" panose="02000503000000020004" pitchFamily="2" charset="0"/>
@@ -15820,13 +15841,18 @@
             <p:ph type="body" sz="quarter" idx="22"/>
           </p:nvPr>
         </p:nvSpPr>
-        <p:spPr/>
+        <p:spPr>
+          <a:xfrm>
+            <a:off x="13891420" y="25029219"/>
+            <a:ext cx="12440573" cy="923322"/>
+          </a:xfrm>
+        </p:spPr>
         <p:txBody>
           <a:bodyPr/>
           <a:lstStyle/>
           <a:p>
             <a:r>
-              <a:rPr lang="en-US" dirty="0"/>
+              <a:rPr lang="en-US" sz="4800" dirty="0"/>
               <a:t>MATERIALS AND METHODS</a:t>
             </a:r>
           </a:p>
@@ -15842,12 +15868,105 @@
             <p:ph type="body" sz="quarter" idx="23"/>
           </p:nvPr>
         </p:nvSpPr>
-        <p:spPr/>
+        <p:spPr>
+          <a:xfrm>
+            <a:off x="14050476" y="7102294"/>
+            <a:ext cx="12132653" cy="4237592"/>
+          </a:xfrm>
+        </p:spPr>
         <p:txBody>
           <a:bodyPr/>
           <a:lstStyle/>
           <a:p>
-            <a:endParaRPr lang="en-US" dirty="0">
+            <a:r>
+              <a:rPr lang="en-US" sz="3000" b="1" dirty="0">
+                <a:latin typeface="Helvetica Neue" panose="02000503000000020004" pitchFamily="2" charset="0"/>
+                <a:ea typeface="Helvetica Neue" panose="02000503000000020004" pitchFamily="2" charset="0"/>
+                <a:cs typeface="Helvetica Neue" panose="02000503000000020004" pitchFamily="2" charset="0"/>
+              </a:rPr>
+              <a:t>Mean Average Precision (</a:t>
+            </a:r>
+            <a:r>
+              <a:rPr lang="en-US" sz="3000" b="1" dirty="0" err="1">
+                <a:latin typeface="Helvetica Neue" panose="02000503000000020004" pitchFamily="2" charset="0"/>
+                <a:ea typeface="Helvetica Neue" panose="02000503000000020004" pitchFamily="2" charset="0"/>
+                <a:cs typeface="Helvetica Neue" panose="02000503000000020004" pitchFamily="2" charset="0"/>
+              </a:rPr>
+              <a:t>mAP</a:t>
+            </a:r>
+            <a:r>
+              <a:rPr lang="en-US" sz="3000" b="1" dirty="0">
+                <a:latin typeface="Helvetica Neue" panose="02000503000000020004" pitchFamily="2" charset="0"/>
+                <a:ea typeface="Helvetica Neue" panose="02000503000000020004" pitchFamily="2" charset="0"/>
+                <a:cs typeface="Helvetica Neue" panose="02000503000000020004" pitchFamily="2" charset="0"/>
+              </a:rPr>
+              <a:t>) Analysis</a:t>
+            </a:r>
+          </a:p>
+          <a:p>
+            <a:endParaRPr lang="en-US" sz="3000" b="1" dirty="0">
+              <a:latin typeface="Helvetica Neue" panose="02000503000000020004" pitchFamily="2" charset="0"/>
+              <a:ea typeface="Helvetica Neue" panose="02000503000000020004" pitchFamily="2" charset="0"/>
+              <a:cs typeface="Helvetica Neue" panose="02000503000000020004" pitchFamily="2" charset="0"/>
+            </a:endParaRPr>
+          </a:p>
+          <a:p>
+            <a:endParaRPr lang="en-US" sz="3000" b="1" dirty="0">
+              <a:latin typeface="Helvetica Neue" panose="02000503000000020004" pitchFamily="2" charset="0"/>
+              <a:ea typeface="Helvetica Neue" panose="02000503000000020004" pitchFamily="2" charset="0"/>
+              <a:cs typeface="Helvetica Neue" panose="02000503000000020004" pitchFamily="2" charset="0"/>
+            </a:endParaRPr>
+          </a:p>
+          <a:p>
+            <a:endParaRPr lang="en-US" sz="3000" b="1" dirty="0">
+              <a:latin typeface="Helvetica Neue" panose="02000503000000020004" pitchFamily="2" charset="0"/>
+              <a:ea typeface="Helvetica Neue" panose="02000503000000020004" pitchFamily="2" charset="0"/>
+              <a:cs typeface="Helvetica Neue" panose="02000503000000020004" pitchFamily="2" charset="0"/>
+            </a:endParaRPr>
+          </a:p>
+          <a:p>
+            <a:endParaRPr lang="en-US" sz="3000" b="1" dirty="0">
+              <a:latin typeface="Helvetica Neue" panose="02000503000000020004" pitchFamily="2" charset="0"/>
+              <a:ea typeface="Helvetica Neue" panose="02000503000000020004" pitchFamily="2" charset="0"/>
+              <a:cs typeface="Helvetica Neue" panose="02000503000000020004" pitchFamily="2" charset="0"/>
+            </a:endParaRPr>
+          </a:p>
+          <a:p>
+            <a:endParaRPr lang="en-US" sz="3000" b="1" dirty="0">
+              <a:latin typeface="Helvetica Neue" panose="02000503000000020004" pitchFamily="2" charset="0"/>
+              <a:ea typeface="Helvetica Neue" panose="02000503000000020004" pitchFamily="2" charset="0"/>
+              <a:cs typeface="Helvetica Neue" panose="02000503000000020004" pitchFamily="2" charset="0"/>
+            </a:endParaRPr>
+          </a:p>
+          <a:p>
+            <a:pPr marL="342900" indent="-342900">
+              <a:buFont typeface="Arial" panose="020B0604020202020204" pitchFamily="34" charset="0"/>
+              <a:buChar char="•"/>
+            </a:pPr>
+            <a:r>
+              <a:rPr lang="en-US" sz="3000" dirty="0">
+                <a:latin typeface="Helvetica Neue" panose="02000503000000020004" pitchFamily="2" charset="0"/>
+                <a:ea typeface="Helvetica Neue" panose="02000503000000020004" pitchFamily="2" charset="0"/>
+                <a:cs typeface="Helvetica Neue" panose="02000503000000020004" pitchFamily="2" charset="0"/>
+              </a:rPr>
+              <a:t>3000 weights optimal, with __ </a:t>
+            </a:r>
+            <a:r>
+              <a:rPr lang="en-US" sz="3000" dirty="0" err="1">
+                <a:latin typeface="Helvetica Neue" panose="02000503000000020004" pitchFamily="2" charset="0"/>
+                <a:ea typeface="Helvetica Neue" panose="02000503000000020004" pitchFamily="2" charset="0"/>
+                <a:cs typeface="Helvetica Neue" panose="02000503000000020004" pitchFamily="2" charset="0"/>
+              </a:rPr>
+              <a:t>mAP</a:t>
+            </a:r>
+            <a:endParaRPr lang="en-US" sz="3000" dirty="0">
+              <a:latin typeface="Helvetica Neue" panose="02000503000000020004" pitchFamily="2" charset="0"/>
+              <a:ea typeface="Helvetica Neue" panose="02000503000000020004" pitchFamily="2" charset="0"/>
+              <a:cs typeface="Helvetica Neue" panose="02000503000000020004" pitchFamily="2" charset="0"/>
+            </a:endParaRPr>
+          </a:p>
+          <a:p>
+            <a:endParaRPr lang="en-US" sz="3000" dirty="0">
               <a:latin typeface="Helvetica Neue" panose="02000503000000020004" pitchFamily="2" charset="0"/>
               <a:ea typeface="Helvetica Neue" panose="02000503000000020004" pitchFamily="2" charset="0"/>
               <a:cs typeface="Helvetica Neue" panose="02000503000000020004" pitchFamily="2" charset="0"/>
@@ -15865,12 +15984,20 @@
             <p:ph type="body" sz="quarter" idx="24"/>
           </p:nvPr>
         </p:nvSpPr>
-        <p:spPr/>
+        <p:spPr>
+          <a:xfrm>
+            <a:off x="13892878" y="6319847"/>
+            <a:ext cx="12447852" cy="923322"/>
+          </a:xfrm>
+        </p:spPr>
         <p:txBody>
           <a:bodyPr/>
           <a:lstStyle/>
           <a:p>
-            <a:endParaRPr lang="en-US" dirty="0"/>
+            <a:r>
+              <a:rPr lang="en-US" sz="4800" dirty="0"/>
+              <a:t>RESULTS</a:t>
+            </a:r>
           </a:p>
         </p:txBody>
       </p:sp>
@@ -15884,12 +16011,20 @@
             <p:ph type="body" sz="quarter" idx="25"/>
           </p:nvPr>
         </p:nvSpPr>
-        <p:spPr/>
+        <p:spPr>
+          <a:xfrm>
+            <a:off x="26946097" y="6319847"/>
+            <a:ext cx="12444693" cy="923322"/>
+          </a:xfrm>
+        </p:spPr>
         <p:txBody>
           <a:bodyPr/>
           <a:lstStyle/>
           <a:p>
-            <a:endParaRPr lang="en-US"/>
+            <a:r>
+              <a:rPr lang="en-US" sz="4800" dirty="0"/>
+              <a:t>CONCLUSIONS</a:t>
+            </a:r>
           </a:p>
         </p:txBody>
       </p:sp>
@@ -15903,12 +16038,93 @@
             <p:ph type="body" sz="quarter" idx="26"/>
           </p:nvPr>
         </p:nvSpPr>
-        <p:spPr/>
+        <p:spPr>
+          <a:xfrm>
+            <a:off x="27111833" y="7129168"/>
+            <a:ext cx="12132653" cy="4247294"/>
+          </a:xfrm>
+        </p:spPr>
         <p:txBody>
           <a:bodyPr/>
           <a:lstStyle/>
           <a:p>
-            <a:endParaRPr lang="en-US" dirty="0">
+            <a:r>
+              <a:rPr lang="en-US" sz="3000" b="1" dirty="0">
+                <a:latin typeface="Helvetica Neue" panose="02000503000000020004" pitchFamily="2" charset="0"/>
+                <a:ea typeface="Helvetica Neue" panose="02000503000000020004" pitchFamily="2" charset="0"/>
+                <a:cs typeface="Helvetica Neue" panose="02000503000000020004" pitchFamily="2" charset="0"/>
+              </a:rPr>
+              <a:t>Strengths</a:t>
+            </a:r>
+          </a:p>
+          <a:p>
+            <a:pPr marL="342900" indent="-342900">
+              <a:buFont typeface="Arial" panose="020B0604020202020204" pitchFamily="34" charset="0"/>
+              <a:buChar char="•"/>
+            </a:pPr>
+            <a:r>
+              <a:rPr lang="en-US" sz="3000" dirty="0">
+                <a:latin typeface="Helvetica Neue" panose="02000503000000020004" pitchFamily="2" charset="0"/>
+                <a:ea typeface="Helvetica Neue" panose="02000503000000020004" pitchFamily="2" charset="0"/>
+                <a:cs typeface="Helvetica Neue" panose="02000503000000020004" pitchFamily="2" charset="0"/>
+              </a:rPr>
+              <a:t>Dd</a:t>
+            </a:r>
+          </a:p>
+          <a:p>
+            <a:r>
+              <a:rPr lang="en-US" sz="3000" b="1" dirty="0">
+                <a:latin typeface="Helvetica Neue" panose="02000503000000020004" pitchFamily="2" charset="0"/>
+                <a:ea typeface="Helvetica Neue" panose="02000503000000020004" pitchFamily="2" charset="0"/>
+                <a:cs typeface="Helvetica Neue" panose="02000503000000020004" pitchFamily="2" charset="0"/>
+              </a:rPr>
+              <a:t>Weaknesses</a:t>
+            </a:r>
+          </a:p>
+          <a:p>
+            <a:pPr marL="342900" indent="-342900">
+              <a:buFont typeface="Arial" panose="020B0604020202020204" pitchFamily="34" charset="0"/>
+              <a:buChar char="•"/>
+            </a:pPr>
+            <a:r>
+              <a:rPr lang="en-US" sz="3000" dirty="0">
+                <a:latin typeface="Helvetica Neue" panose="02000503000000020004" pitchFamily="2" charset="0"/>
+                <a:ea typeface="Helvetica Neue" panose="02000503000000020004" pitchFamily="2" charset="0"/>
+                <a:cs typeface="Helvetica Neue" panose="02000503000000020004" pitchFamily="2" charset="0"/>
+              </a:rPr>
+              <a:t>Dd</a:t>
+            </a:r>
+          </a:p>
+          <a:p>
+            <a:r>
+              <a:rPr lang="en-US" sz="3000" b="1" dirty="0">
+                <a:latin typeface="Helvetica Neue" panose="02000503000000020004" pitchFamily="2" charset="0"/>
+                <a:ea typeface="Helvetica Neue" panose="02000503000000020004" pitchFamily="2" charset="0"/>
+                <a:cs typeface="Helvetica Neue" panose="02000503000000020004" pitchFamily="2" charset="0"/>
+              </a:rPr>
+              <a:t>Future Work</a:t>
+            </a:r>
+          </a:p>
+          <a:p>
+            <a:pPr marL="342900" indent="-342900">
+              <a:buFont typeface="Arial" panose="020B0604020202020204" pitchFamily="34" charset="0"/>
+              <a:buChar char="•"/>
+            </a:pPr>
+            <a:r>
+              <a:rPr lang="en-US" sz="3000" dirty="0">
+                <a:latin typeface="Helvetica Neue" panose="02000503000000020004" pitchFamily="2" charset="0"/>
+                <a:ea typeface="Helvetica Neue" panose="02000503000000020004" pitchFamily="2" charset="0"/>
+                <a:cs typeface="Helvetica Neue" panose="02000503000000020004" pitchFamily="2" charset="0"/>
+              </a:rPr>
+              <a:t>Dd</a:t>
+            </a:r>
+          </a:p>
+          <a:p>
+            <a:pPr marL="342900" indent="-342900">
+              <a:buFont typeface="Arial" panose="020B0604020202020204" pitchFamily="34" charset="0"/>
+              <a:buChar char="•"/>
+            </a:pPr>
+            <a:endParaRPr lang="en-US" sz="3000" b="1" dirty="0">
               <a:latin typeface="Helvetica Neue" panose="02000503000000020004" pitchFamily="2" charset="0"/>
               <a:ea typeface="Helvetica Neue" panose="02000503000000020004" pitchFamily="2" charset="0"/>
               <a:cs typeface="Helvetica Neue" panose="02000503000000020004" pitchFamily="2" charset="0"/>
@@ -15926,12 +16142,20 @@
             <p:ph type="body" sz="quarter" idx="27"/>
           </p:nvPr>
         </p:nvSpPr>
-        <p:spPr/>
+        <p:spPr>
+          <a:xfrm>
+            <a:off x="26946097" y="20919447"/>
+            <a:ext cx="12444693" cy="923322"/>
+          </a:xfrm>
+        </p:spPr>
         <p:txBody>
           <a:bodyPr/>
           <a:lstStyle/>
           <a:p>
-            <a:endParaRPr lang="en-US" dirty="0"/>
+            <a:r>
+              <a:rPr lang="en-US" sz="4800" dirty="0"/>
+              <a:t>REFERENCES</a:t>
+            </a:r>
           </a:p>
         </p:txBody>
       </p:sp>
@@ -15945,7 +16169,12 @@
             <p:ph type="body" sz="quarter" idx="28"/>
           </p:nvPr>
         </p:nvSpPr>
-        <p:spPr/>
+        <p:spPr>
+          <a:xfrm>
+            <a:off x="27111832" y="21728765"/>
+            <a:ext cx="12132653" cy="923307"/>
+          </a:xfrm>
+        </p:spPr>
         <p:txBody>
           <a:bodyPr/>
           <a:lstStyle/>
@@ -15955,7 +16184,7 @@
               <a:buChar char="•"/>
             </a:pPr>
             <a:r>
-              <a:rPr lang="en-US" dirty="0">
+              <a:rPr lang="en-US" sz="3000" dirty="0">
                 <a:latin typeface="Helvetica Neue" panose="02000503000000020004" pitchFamily="2" charset="0"/>
                 <a:ea typeface="Helvetica Neue" panose="02000503000000020004" pitchFamily="2" charset="0"/>
                 <a:cs typeface="Helvetica Neue" panose="02000503000000020004" pitchFamily="2" charset="0"/>
@@ -15964,7 +16193,7 @@
               <a:t>https://github.com/AlexeyAB/darknet/</a:t>
             </a:r>
             <a:r>
-              <a:rPr lang="en-US" dirty="0">
+              <a:rPr lang="en-US" sz="3000" dirty="0">
                 <a:latin typeface="Helvetica Neue" panose="02000503000000020004" pitchFamily="2" charset="0"/>
                 <a:ea typeface="Helvetica Neue" panose="02000503000000020004" pitchFamily="2" charset="0"/>
                 <a:cs typeface="Helvetica Neue" panose="02000503000000020004" pitchFamily="2" charset="0"/>
@@ -15984,12 +16213,20 @@
             <p:ph type="body" sz="quarter" idx="29"/>
           </p:nvPr>
         </p:nvSpPr>
-        <p:spPr/>
+        <p:spPr>
+          <a:xfrm>
+            <a:off x="26946097" y="31269879"/>
+            <a:ext cx="12444693" cy="923322"/>
+          </a:xfrm>
+        </p:spPr>
         <p:txBody>
           <a:bodyPr/>
           <a:lstStyle/>
           <a:p>
-            <a:endParaRPr lang="en-US"/>
+            <a:r>
+              <a:rPr lang="en-US" sz="4800" dirty="0"/>
+              <a:t>ACKNOWLEDGEMENTS</a:t>
+            </a:r>
           </a:p>
         </p:txBody>
       </p:sp>
@@ -16005,15 +16242,15 @@
         </p:nvSpPr>
         <p:spPr>
           <a:xfrm>
-            <a:off x="26946098" y="32079200"/>
-            <a:ext cx="12449306" cy="830975"/>
+            <a:off x="27111832" y="32079200"/>
+            <a:ext cx="12132653" cy="923307"/>
           </a:xfrm>
         </p:spPr>
         <p:txBody>
           <a:bodyPr/>
           <a:lstStyle/>
           <a:p>
-            <a:endParaRPr lang="en-US" dirty="0">
+            <a:endParaRPr lang="en-US" sz="3000" dirty="0">
               <a:latin typeface="Helvetica Neue" panose="02000503000000020004" pitchFamily="2" charset="0"/>
               <a:ea typeface="Helvetica Neue" panose="02000503000000020004" pitchFamily="2" charset="0"/>
               <a:cs typeface="Helvetica Neue" panose="02000503000000020004" pitchFamily="2" charset="0"/>
@@ -16091,7 +16328,12 @@
             <p:ph type="body" sz="quarter" idx="151"/>
           </p:nvPr>
         </p:nvSpPr>
-        <p:spPr/>
+        <p:spPr>
+          <a:xfrm>
+            <a:off x="5343525" y="3015740"/>
+            <a:ext cx="29546550" cy="1697355"/>
+          </a:xfrm>
+        </p:spPr>
         <p:txBody>
           <a:bodyPr>
             <a:normAutofit fontScale="92500"/>
@@ -16158,13 +16400,20 @@
             <p:ph type="body" sz="quarter" idx="153"/>
           </p:nvPr>
         </p:nvSpPr>
-        <p:spPr/>
+        <p:spPr>
+          <a:xfrm>
+            <a:off x="5343525" y="864850"/>
+            <a:ext cx="29546550" cy="2077738"/>
+          </a:xfrm>
+        </p:spPr>
         <p:txBody>
-          <a:bodyPr/>
+          <a:bodyPr>
+            <a:normAutofit fontScale="92500" lnSpcReduction="10000"/>
+          </a:bodyPr>
           <a:lstStyle/>
           <a:p>
             <a:r>
-              <a:rPr lang="en-US" dirty="0">
+              <a:rPr lang="en-US" sz="15400" dirty="0">
                 <a:solidFill>
                   <a:schemeClr val="accent5">
                     <a:lumMod val="50000"/>
@@ -16172,6 +16421,301 @@
                 </a:solidFill>
               </a:rPr>
               <a:t>YOLO!</a:t>
+            </a:r>
+          </a:p>
+        </p:txBody>
+      </p:sp>
+      <p:pic>
+        <p:nvPicPr>
+          <p:cNvPr id="16" name="Graphic 15">
+            <a:extLst>
+              <a:ext uri="{FF2B5EF4-FFF2-40B4-BE49-F238E27FC236}">
+                <a16:creationId xmlns:a16="http://schemas.microsoft.com/office/drawing/2014/main" id="{0516DDA5-B5DF-A143-AA47-4E1546D4ED6D}"/>
+              </a:ext>
+            </a:extLst>
+          </p:cNvPr>
+          <p:cNvPicPr>
+            <a:picLocks noChangeAspect="1"/>
+          </p:cNvPicPr>
+          <p:nvPr/>
+        </p:nvPicPr>
+        <p:blipFill>
+          <a:blip r:embed="rId4">
+            <a:extLst>
+              <a:ext uri="{28A0092B-C50C-407E-A947-70E740481C1C}">
+                <a14:useLocalDpi xmlns:a14="http://schemas.microsoft.com/office/drawing/2010/main" val="0"/>
+              </a:ext>
+              <a:ext uri="{96DAC541-7B7A-43D3-8B79-37D633B846F1}">
+                <asvg:svgBlip xmlns:asvg="http://schemas.microsoft.com/office/drawing/2016/SVG/main" r:embed="rId5"/>
+              </a:ext>
+            </a:extLst>
+          </a:blip>
+          <a:stretch>
+            <a:fillRect/>
+          </a:stretch>
+        </p:blipFill>
+        <p:spPr>
+          <a:xfrm>
+            <a:off x="14050476" y="7847712"/>
+            <a:ext cx="4044217" cy="2696145"/>
+          </a:xfrm>
+          <a:prstGeom prst="rect">
+            <a:avLst/>
+          </a:prstGeom>
+        </p:spPr>
+      </p:pic>
+      <p:pic>
+        <p:nvPicPr>
+          <p:cNvPr id="18" name="Graphic 17">
+            <a:extLst>
+              <a:ext uri="{FF2B5EF4-FFF2-40B4-BE49-F238E27FC236}">
+                <a16:creationId xmlns:a16="http://schemas.microsoft.com/office/drawing/2014/main" id="{BDBDF0FD-EBC9-4949-8DCF-45E6741D5785}"/>
+              </a:ext>
+            </a:extLst>
+          </p:cNvPr>
+          <p:cNvPicPr>
+            <a:picLocks noChangeAspect="1"/>
+          </p:cNvPicPr>
+          <p:nvPr/>
+        </p:nvPicPr>
+        <p:blipFill>
+          <a:blip r:embed="rId6">
+            <a:extLst>
+              <a:ext uri="{28A0092B-C50C-407E-A947-70E740481C1C}">
+                <a14:useLocalDpi xmlns:a14="http://schemas.microsoft.com/office/drawing/2010/main" val="0"/>
+              </a:ext>
+              <a:ext uri="{96DAC541-7B7A-43D3-8B79-37D633B846F1}">
+                <asvg:svgBlip xmlns:asvg="http://schemas.microsoft.com/office/drawing/2016/SVG/main" r:embed="rId7"/>
+              </a:ext>
+            </a:extLst>
+          </a:blip>
+          <a:stretch>
+            <a:fillRect/>
+          </a:stretch>
+        </p:blipFill>
+        <p:spPr>
+          <a:xfrm>
+            <a:off x="18094693" y="7850260"/>
+            <a:ext cx="4044219" cy="2696145"/>
+          </a:xfrm>
+          <a:prstGeom prst="rect">
+            <a:avLst/>
+          </a:prstGeom>
+        </p:spPr>
+      </p:pic>
+      <p:pic>
+        <p:nvPicPr>
+          <p:cNvPr id="20" name="Graphic 19">
+            <a:extLst>
+              <a:ext uri="{FF2B5EF4-FFF2-40B4-BE49-F238E27FC236}">
+                <a16:creationId xmlns:a16="http://schemas.microsoft.com/office/drawing/2014/main" id="{31202E62-E73E-6E47-AB50-49C9040EF939}"/>
+              </a:ext>
+            </a:extLst>
+          </p:cNvPr>
+          <p:cNvPicPr>
+            <a:picLocks noChangeAspect="1"/>
+          </p:cNvPicPr>
+          <p:nvPr/>
+        </p:nvPicPr>
+        <p:blipFill>
+          <a:blip r:embed="rId8">
+            <a:extLst>
+              <a:ext uri="{28A0092B-C50C-407E-A947-70E740481C1C}">
+                <a14:useLocalDpi xmlns:a14="http://schemas.microsoft.com/office/drawing/2010/main" val="0"/>
+              </a:ext>
+              <a:ext uri="{96DAC541-7B7A-43D3-8B79-37D633B846F1}">
+                <asvg:svgBlip xmlns:asvg="http://schemas.microsoft.com/office/drawing/2016/SVG/main" r:embed="rId9"/>
+              </a:ext>
+            </a:extLst>
+          </a:blip>
+          <a:stretch>
+            <a:fillRect/>
+          </a:stretch>
+        </p:blipFill>
+        <p:spPr>
+          <a:xfrm>
+            <a:off x="22138912" y="7847712"/>
+            <a:ext cx="4044217" cy="2696145"/>
+          </a:xfrm>
+          <a:prstGeom prst="rect">
+            <a:avLst/>
+          </a:prstGeom>
+        </p:spPr>
+      </p:pic>
+      <p:sp>
+        <p:nvSpPr>
+          <p:cNvPr id="38" name="Text Placeholder 358">
+            <a:extLst>
+              <a:ext uri="{FF2B5EF4-FFF2-40B4-BE49-F238E27FC236}">
+                <a16:creationId xmlns:a16="http://schemas.microsoft.com/office/drawing/2014/main" id="{B0798DC3-4C24-B14F-9172-5AFF41BB9E04}"/>
+              </a:ext>
+            </a:extLst>
+          </p:cNvPr>
+          <p:cNvSpPr txBox="1">
+            <a:spLocks/>
+          </p:cNvSpPr>
+          <p:nvPr/>
+        </p:nvSpPr>
+        <p:spPr>
+          <a:xfrm>
+            <a:off x="14050476" y="11196986"/>
+            <a:ext cx="12132653" cy="923307"/>
+          </a:xfrm>
+          <a:prstGeom prst="rect">
+            <a:avLst/>
+          </a:prstGeom>
+        </p:spPr>
+        <p:txBody>
+          <a:bodyPr wrap="square" lIns="228589" tIns="228589" rIns="228589" bIns="228589">
+            <a:spAutoFit/>
+          </a:bodyPr>
+          <a:lstStyle>
+            <a:lvl1pPr marL="0" indent="0" algn="l" defTabSz="4023305" rtl="0" eaLnBrk="1" latinLnBrk="0" hangingPunct="1">
+              <a:spcBef>
+                <a:spcPct val="20000"/>
+              </a:spcBef>
+              <a:buFont typeface="Arial" pitchFamily="34" charset="0"/>
+              <a:buNone/>
+              <a:defRPr sz="2400" kern="1200">
+                <a:solidFill>
+                  <a:schemeClr val="accent5">
+                    <a:lumMod val="50000"/>
+                  </a:schemeClr>
+                </a:solidFill>
+                <a:latin typeface="Times New Roman" panose="02020603050405020304" pitchFamily="18" charset="0"/>
+                <a:ea typeface="+mn-ea"/>
+                <a:cs typeface="Times New Roman" panose="02020603050405020304" pitchFamily="18" charset="0"/>
+              </a:defRPr>
+            </a:lvl1pPr>
+            <a:lvl2pPr marL="1362056" indent="-523867" algn="l" defTabSz="4023305" rtl="0" eaLnBrk="1" latinLnBrk="0" hangingPunct="1">
+              <a:spcBef>
+                <a:spcPct val="20000"/>
+              </a:spcBef>
+              <a:buFont typeface="Arial" pitchFamily="34" charset="0"/>
+              <a:buChar char="–"/>
+              <a:defRPr sz="2292" kern="1200">
+                <a:solidFill>
+                  <a:schemeClr val="tx1"/>
+                </a:solidFill>
+                <a:latin typeface="Trebuchet MS" pitchFamily="34" charset="0"/>
+                <a:ea typeface="+mn-ea"/>
+                <a:cs typeface="+mn-cs"/>
+              </a:defRPr>
+            </a:lvl2pPr>
+            <a:lvl3pPr marL="1885924" indent="-523867" algn="l" defTabSz="4023305" rtl="0" eaLnBrk="1" latinLnBrk="0" hangingPunct="1">
+              <a:spcBef>
+                <a:spcPct val="20000"/>
+              </a:spcBef>
+              <a:buFont typeface="Arial" pitchFamily="34" charset="0"/>
+              <a:buChar char="•"/>
+              <a:defRPr sz="2292" kern="1200">
+                <a:solidFill>
+                  <a:schemeClr val="tx1"/>
+                </a:solidFill>
+                <a:latin typeface="Trebuchet MS" pitchFamily="34" charset="0"/>
+                <a:ea typeface="+mn-ea"/>
+                <a:cs typeface="+mn-cs"/>
+              </a:defRPr>
+            </a:lvl3pPr>
+            <a:lvl4pPr marL="2462179" indent="-576255" algn="l" defTabSz="4023305" rtl="0" eaLnBrk="1" latinLnBrk="0" hangingPunct="1">
+              <a:spcBef>
+                <a:spcPct val="20000"/>
+              </a:spcBef>
+              <a:buFont typeface="Arial" pitchFamily="34" charset="0"/>
+              <a:buChar char="–"/>
+              <a:defRPr sz="2292" kern="1200">
+                <a:solidFill>
+                  <a:schemeClr val="tx1"/>
+                </a:solidFill>
+                <a:latin typeface="Trebuchet MS" pitchFamily="34" charset="0"/>
+                <a:ea typeface="+mn-ea"/>
+                <a:cs typeface="+mn-cs"/>
+              </a:defRPr>
+            </a:lvl4pPr>
+            <a:lvl5pPr marL="2881273" indent="-419094" algn="l" defTabSz="4023305" rtl="0" eaLnBrk="1" latinLnBrk="0" hangingPunct="1">
+              <a:spcBef>
+                <a:spcPct val="20000"/>
+              </a:spcBef>
+              <a:buFont typeface="Arial" pitchFamily="34" charset="0"/>
+              <a:buChar char="»"/>
+              <a:defRPr sz="2292" kern="1200">
+                <a:solidFill>
+                  <a:schemeClr val="tx1"/>
+                </a:solidFill>
+                <a:latin typeface="Trebuchet MS" pitchFamily="34" charset="0"/>
+                <a:ea typeface="+mn-ea"/>
+                <a:cs typeface="+mn-cs"/>
+              </a:defRPr>
+            </a:lvl5pPr>
+            <a:lvl6pPr marL="11064090" indent="-1005827" algn="l" defTabSz="4023305" rtl="0" eaLnBrk="1" latinLnBrk="0" hangingPunct="1">
+              <a:spcBef>
+                <a:spcPct val="20000"/>
+              </a:spcBef>
+              <a:buFont typeface="Arial" pitchFamily="34" charset="0"/>
+              <a:buChar char="•"/>
+              <a:defRPr sz="8800" kern="1200">
+                <a:solidFill>
+                  <a:schemeClr val="tx1"/>
+                </a:solidFill>
+                <a:latin typeface="+mn-lt"/>
+                <a:ea typeface="+mn-ea"/>
+                <a:cs typeface="+mn-cs"/>
+              </a:defRPr>
+            </a:lvl6pPr>
+            <a:lvl7pPr marL="13075741" indent="-1005827" algn="l" defTabSz="4023305" rtl="0" eaLnBrk="1" latinLnBrk="0" hangingPunct="1">
+              <a:spcBef>
+                <a:spcPct val="20000"/>
+              </a:spcBef>
+              <a:buFont typeface="Arial" pitchFamily="34" charset="0"/>
+              <a:buChar char="•"/>
+              <a:defRPr sz="8800" kern="1200">
+                <a:solidFill>
+                  <a:schemeClr val="tx1"/>
+                </a:solidFill>
+                <a:latin typeface="+mn-lt"/>
+                <a:ea typeface="+mn-ea"/>
+                <a:cs typeface="+mn-cs"/>
+              </a:defRPr>
+            </a:lvl7pPr>
+            <a:lvl8pPr marL="15087394" indent="-1005827" algn="l" defTabSz="4023305" rtl="0" eaLnBrk="1" latinLnBrk="0" hangingPunct="1">
+              <a:spcBef>
+                <a:spcPct val="20000"/>
+              </a:spcBef>
+              <a:buFont typeface="Arial" pitchFamily="34" charset="0"/>
+              <a:buChar char="•"/>
+              <a:defRPr sz="8800" kern="1200">
+                <a:solidFill>
+                  <a:schemeClr val="tx1"/>
+                </a:solidFill>
+                <a:latin typeface="+mn-lt"/>
+                <a:ea typeface="+mn-ea"/>
+                <a:cs typeface="+mn-cs"/>
+              </a:defRPr>
+            </a:lvl8pPr>
+            <a:lvl9pPr marL="17099047" indent="-1005827" algn="l" defTabSz="4023305" rtl="0" eaLnBrk="1" latinLnBrk="0" hangingPunct="1">
+              <a:spcBef>
+                <a:spcPct val="20000"/>
+              </a:spcBef>
+              <a:buFont typeface="Arial" pitchFamily="34" charset="0"/>
+              <a:buChar char="•"/>
+              <a:defRPr sz="8800" kern="1200">
+                <a:solidFill>
+                  <a:schemeClr val="tx1"/>
+                </a:solidFill>
+                <a:latin typeface="+mn-lt"/>
+                <a:ea typeface="+mn-ea"/>
+                <a:cs typeface="+mn-cs"/>
+              </a:defRPr>
+            </a:lvl9pPr>
+          </a:lstStyle>
+          <a:p>
+            <a:r>
+              <a:rPr lang="en-US" sz="3000" b="1" dirty="0">
+                <a:latin typeface="Helvetica Neue" panose="02000503000000020004" pitchFamily="2" charset="0"/>
+                <a:ea typeface="Helvetica Neue" panose="02000503000000020004" pitchFamily="2" charset="0"/>
+                <a:cs typeface="Helvetica Neue" panose="02000503000000020004" pitchFamily="2" charset="0"/>
+              </a:rPr>
+              <a:t>Multi-Class vs. Single-Class Detection</a:t>
             </a:r>
           </a:p>
         </p:txBody>

</xml_diff>